<commit_message>
add explanation about main file
</commit_message>
<xml_diff>
--- a/HW_1/BGA DOCUMENT.pptx
+++ b/HW_1/BGA DOCUMENT.pptx
@@ -5,7 +5,7 @@
     <p:sldMasterId id="2147483714" r:id="rId1"/>
   </p:sldMasterIdLst>
   <p:notesMasterIdLst>
-    <p:notesMasterId r:id="rId40"/>
+    <p:notesMasterId r:id="rId41"/>
   </p:notesMasterIdLst>
   <p:sldIdLst>
     <p:sldId id="256" r:id="rId2"/>
@@ -46,6 +46,7 @@
     <p:sldId id="292" r:id="rId37"/>
     <p:sldId id="295" r:id="rId38"/>
     <p:sldId id="300" r:id="rId39"/>
+    <p:sldId id="301" r:id="rId40"/>
   </p:sldIdLst>
   <p:sldSz cx="12192000" cy="6858000"/>
   <p:notesSz cx="6858000" cy="9144000"/>
@@ -12653,6 +12654,174 @@
 </p:sld>
 </file>
 
+<file path=ppt/slides/slide39.xml><?xml version="1.0" encoding="utf-8"?>
+<p:sld xmlns:a="http://schemas.openxmlformats.org/drawingml/2006/main" xmlns:r="http://schemas.openxmlformats.org/officeDocument/2006/relationships" xmlns:p="http://schemas.openxmlformats.org/presentationml/2006/main">
+  <p:cSld>
+    <p:spTree>
+      <p:nvGrpSpPr>
+        <p:cNvPr id="1" name=""/>
+        <p:cNvGrpSpPr/>
+        <p:nvPr/>
+      </p:nvGrpSpPr>
+      <p:grpSpPr>
+        <a:xfrm>
+          <a:off x="0" y="0"/>
+          <a:ext cx="0" cy="0"/>
+          <a:chOff x="0" y="0"/>
+          <a:chExt cx="0" cy="0"/>
+        </a:xfrm>
+      </p:grpSpPr>
+      <p:sp>
+        <p:nvSpPr>
+          <p:cNvPr id="2" name="Slide Number Placeholder 1">
+            <a:extLst>
+              <a:ext uri="{FF2B5EF4-FFF2-40B4-BE49-F238E27FC236}">
+                <a16:creationId xmlns:a16="http://schemas.microsoft.com/office/drawing/2014/main" id="{4E6C3D27-FC63-3CA0-3203-ED29DDC86EE0}"/>
+              </a:ext>
+            </a:extLst>
+          </p:cNvPr>
+          <p:cNvSpPr>
+            <a:spLocks noGrp="1"/>
+          </p:cNvSpPr>
+          <p:nvPr>
+            <p:ph type="sldNum" sz="quarter" idx="12"/>
+          </p:nvPr>
+        </p:nvSpPr>
+        <p:spPr/>
+        <p:txBody>
+          <a:bodyPr/>
+          <a:lstStyle/>
+          <a:p>
+            <a:fld id="{3C0831EE-1F9D-4CCF-8E80-848D7ADA45CA}" type="slidenum">
+              <a:rPr lang="en-US" smtClean="0"/>
+              <a:t>39</a:t>
+            </a:fld>
+            <a:endParaRPr lang="en-US"/>
+          </a:p>
+        </p:txBody>
+      </p:sp>
+      <p:sp>
+        <p:nvSpPr>
+          <p:cNvPr id="5" name="TextBox 4">
+            <a:extLst>
+              <a:ext uri="{FF2B5EF4-FFF2-40B4-BE49-F238E27FC236}">
+                <a16:creationId xmlns:a16="http://schemas.microsoft.com/office/drawing/2014/main" id="{99E8CEFD-DB7A-5A4C-57FB-0454F5F56F40}"/>
+              </a:ext>
+            </a:extLst>
+          </p:cNvPr>
+          <p:cNvSpPr txBox="1"/>
+          <p:nvPr/>
+        </p:nvSpPr>
+        <p:spPr>
+          <a:xfrm>
+            <a:off x="3352800" y="493486"/>
+            <a:ext cx="5544457" cy="523220"/>
+          </a:xfrm>
+          <a:prstGeom prst="rect">
+            <a:avLst/>
+          </a:prstGeom>
+          <a:noFill/>
+        </p:spPr>
+        <p:txBody>
+          <a:bodyPr wrap="square" rtlCol="0">
+            <a:spAutoFit/>
+          </a:bodyPr>
+          <a:lstStyle/>
+          <a:p>
+            <a:pPr algn="ctr" rtl="1"/>
+            <a:r>
+              <a:rPr lang="fa-IR" sz="2800" b="1" dirty="0"/>
+              <a:t>فایل </a:t>
+            </a:r>
+            <a:r>
+              <a:rPr lang="en-US" sz="2800" b="1" dirty="0"/>
+              <a:t>main.py</a:t>
+            </a:r>
+          </a:p>
+        </p:txBody>
+      </p:sp>
+      <p:sp>
+        <p:nvSpPr>
+          <p:cNvPr id="6" name="TextBox 5">
+            <a:extLst>
+              <a:ext uri="{FF2B5EF4-FFF2-40B4-BE49-F238E27FC236}">
+                <a16:creationId xmlns:a16="http://schemas.microsoft.com/office/drawing/2014/main" id="{453CA55C-B208-3CD3-4FC1-50FE5844E0E7}"/>
+              </a:ext>
+            </a:extLst>
+          </p:cNvPr>
+          <p:cNvSpPr txBox="1"/>
+          <p:nvPr/>
+        </p:nvSpPr>
+        <p:spPr>
+          <a:xfrm>
+            <a:off x="841829" y="1286425"/>
+            <a:ext cx="10911114" cy="1323439"/>
+          </a:xfrm>
+          <a:prstGeom prst="rect">
+            <a:avLst/>
+          </a:prstGeom>
+          <a:noFill/>
+        </p:spPr>
+        <p:txBody>
+          <a:bodyPr wrap="square" rtlCol="0">
+            <a:spAutoFit/>
+          </a:bodyPr>
+          <a:lstStyle/>
+          <a:p>
+            <a:pPr algn="r" rtl="1"/>
+            <a:r>
+              <a:rPr lang="fa-IR" sz="2000" dirty="0"/>
+              <a:t>    فایل </a:t>
+            </a:r>
+            <a:r>
+              <a:rPr lang="en-US" sz="2000" dirty="0"/>
+              <a:t>main.py</a:t>
+            </a:r>
+            <a:r>
+              <a:rPr lang="fa-IR" sz="2000" dirty="0"/>
+              <a:t> فایل اصلی برای تست و استفاده از الگوریتم می باشد. در این فایل, ماژول </a:t>
+            </a:r>
+            <a:r>
+              <a:rPr lang="en-US" sz="2000" dirty="0"/>
+              <a:t>BGA</a:t>
+            </a:r>
+            <a:r>
+              <a:rPr lang="fa-IR" sz="2000" dirty="0"/>
+              <a:t> که شامل کلاس مربوط به پیاده سازی الگوریتم و ماژول </a:t>
+            </a:r>
+            <a:r>
+              <a:rPr lang="en-US" sz="2000" dirty="0"/>
+              <a:t>theorem</a:t>
+            </a:r>
+            <a:r>
+              <a:rPr lang="fa-IR" sz="2000" dirty="0"/>
+              <a:t> که توابع تست در آن قرار دارند بارگذاری شده است. برای تست و استفاده از الگوریتم, کافی است که یک نمونه از کلاس مربوطه ساخته و تابع مد نظر از ماژول مربوطه را مشخص کنیم و در نهایت تابع </a:t>
+            </a:r>
+            <a:r>
+              <a:rPr lang="en-US" sz="2000" dirty="0"/>
+              <a:t>run </a:t>
+            </a:r>
+            <a:r>
+              <a:rPr lang="fa-IR" sz="2000"/>
+              <a:t> را برای شی ساخته شده فراخوانی کنیم.</a:t>
+            </a:r>
+            <a:endParaRPr lang="en-US" sz="2000" dirty="0"/>
+          </a:p>
+        </p:txBody>
+      </p:sp>
+    </p:spTree>
+    <p:extLst>
+      <p:ext uri="{BB962C8B-B14F-4D97-AF65-F5344CB8AC3E}">
+        <p14:creationId xmlns:p14="http://schemas.microsoft.com/office/powerpoint/2010/main" val="1849701047"/>
+      </p:ext>
+    </p:extLst>
+  </p:cSld>
+  <p:clrMapOvr>
+    <a:masterClrMapping/>
+  </p:clrMapOvr>
+</p:sld>
+</file>
+
 <file path=ppt/slides/slide4.xml><?xml version="1.0" encoding="utf-8"?>
 <p:sld xmlns:a="http://schemas.openxmlformats.org/drawingml/2006/main" xmlns:r="http://schemas.openxmlformats.org/officeDocument/2006/relationships" xmlns:p="http://schemas.openxmlformats.org/presentationml/2006/main">
   <p:cSld>

</xml_diff>